<commit_message>
moved Alice's painting right
</commit_message>
<xml_diff>
--- a/oriented.pptx
+++ b/oriented.pptx
@@ -288,7 +288,7 @@
           <a:p>
             <a:fld id="{D49555AC-EF36-440B-8C1B-720548F138AE}" type="datetimeFigureOut">
               <a:rPr lang="en-GB" smtClean="0"/>
-              <a:t>20/03/2015</a:t>
+              <a:t>23/03/2015</a:t>
             </a:fld>
             <a:endParaRPr lang="en-GB"/>
           </a:p>
@@ -458,7 +458,7 @@
           <a:p>
             <a:fld id="{D49555AC-EF36-440B-8C1B-720548F138AE}" type="datetimeFigureOut">
               <a:rPr lang="en-GB" smtClean="0"/>
-              <a:t>20/03/2015</a:t>
+              <a:t>23/03/2015</a:t>
             </a:fld>
             <a:endParaRPr lang="en-GB"/>
           </a:p>
@@ -638,7 +638,7 @@
           <a:p>
             <a:fld id="{D49555AC-EF36-440B-8C1B-720548F138AE}" type="datetimeFigureOut">
               <a:rPr lang="en-GB" smtClean="0"/>
-              <a:t>20/03/2015</a:t>
+              <a:t>23/03/2015</a:t>
             </a:fld>
             <a:endParaRPr lang="en-GB"/>
           </a:p>
@@ -808,7 +808,7 @@
           <a:p>
             <a:fld id="{D49555AC-EF36-440B-8C1B-720548F138AE}" type="datetimeFigureOut">
               <a:rPr lang="en-GB" smtClean="0"/>
-              <a:t>20/03/2015</a:t>
+              <a:t>23/03/2015</a:t>
             </a:fld>
             <a:endParaRPr lang="en-GB"/>
           </a:p>
@@ -1054,7 +1054,7 @@
           <a:p>
             <a:fld id="{D49555AC-EF36-440B-8C1B-720548F138AE}" type="datetimeFigureOut">
               <a:rPr lang="en-GB" smtClean="0"/>
-              <a:t>20/03/2015</a:t>
+              <a:t>23/03/2015</a:t>
             </a:fld>
             <a:endParaRPr lang="en-GB"/>
           </a:p>
@@ -1342,7 +1342,7 @@
           <a:p>
             <a:fld id="{D49555AC-EF36-440B-8C1B-720548F138AE}" type="datetimeFigureOut">
               <a:rPr lang="en-GB" smtClean="0"/>
-              <a:t>20/03/2015</a:t>
+              <a:t>23/03/2015</a:t>
             </a:fld>
             <a:endParaRPr lang="en-GB"/>
           </a:p>
@@ -1764,7 +1764,7 @@
           <a:p>
             <a:fld id="{D49555AC-EF36-440B-8C1B-720548F138AE}" type="datetimeFigureOut">
               <a:rPr lang="en-GB" smtClean="0"/>
-              <a:t>20/03/2015</a:t>
+              <a:t>23/03/2015</a:t>
             </a:fld>
             <a:endParaRPr lang="en-GB"/>
           </a:p>
@@ -1882,7 +1882,7 @@
           <a:p>
             <a:fld id="{D49555AC-EF36-440B-8C1B-720548F138AE}" type="datetimeFigureOut">
               <a:rPr lang="en-GB" smtClean="0"/>
-              <a:t>20/03/2015</a:t>
+              <a:t>23/03/2015</a:t>
             </a:fld>
             <a:endParaRPr lang="en-GB"/>
           </a:p>
@@ -1977,7 +1977,7 @@
           <a:p>
             <a:fld id="{D49555AC-EF36-440B-8C1B-720548F138AE}" type="datetimeFigureOut">
               <a:rPr lang="en-GB" smtClean="0"/>
-              <a:t>20/03/2015</a:t>
+              <a:t>23/03/2015</a:t>
             </a:fld>
             <a:endParaRPr lang="en-GB"/>
           </a:p>
@@ -2254,7 +2254,7 @@
           <a:p>
             <a:fld id="{D49555AC-EF36-440B-8C1B-720548F138AE}" type="datetimeFigureOut">
               <a:rPr lang="en-GB" smtClean="0"/>
-              <a:t>20/03/2015</a:t>
+              <a:t>23/03/2015</a:t>
             </a:fld>
             <a:endParaRPr lang="en-GB"/>
           </a:p>
@@ -2507,7 +2507,7 @@
           <a:p>
             <a:fld id="{D49555AC-EF36-440B-8C1B-720548F138AE}" type="datetimeFigureOut">
               <a:rPr lang="en-GB" smtClean="0"/>
-              <a:t>20/03/2015</a:t>
+              <a:t>23/03/2015</a:t>
             </a:fld>
             <a:endParaRPr lang="en-GB"/>
           </a:p>
@@ -2720,7 +2720,7 @@
           <a:p>
             <a:fld id="{D49555AC-EF36-440B-8C1B-720548F138AE}" type="datetimeFigureOut">
               <a:rPr lang="en-GB" smtClean="0"/>
-              <a:t>20/03/2015</a:t>
+              <a:t>23/03/2015</a:t>
             </a:fld>
             <a:endParaRPr lang="en-GB"/>
           </a:p>
@@ -7468,7 +7468,7 @@
         </p:blipFill>
         <p:spPr>
           <a:xfrm rot="16200000">
-            <a:off x="1051022" y="5013875"/>
+            <a:off x="7052791" y="4886855"/>
             <a:ext cx="1215536" cy="2138550"/>
           </a:xfrm>
           <a:prstGeom prst="rect">

</xml_diff>

<commit_message>
Worked on intro and discussion
</commit_message>
<xml_diff>
--- a/oriented.pptx
+++ b/oriented.pptx
@@ -288,7 +288,7 @@
           <a:p>
             <a:fld id="{D49555AC-EF36-440B-8C1B-720548F138AE}" type="datetimeFigureOut">
               <a:rPr lang="en-GB" smtClean="0"/>
-              <a:t>23/03/2015</a:t>
+              <a:t>27/03/2015</a:t>
             </a:fld>
             <a:endParaRPr lang="en-GB"/>
           </a:p>
@@ -458,7 +458,7 @@
           <a:p>
             <a:fld id="{D49555AC-EF36-440B-8C1B-720548F138AE}" type="datetimeFigureOut">
               <a:rPr lang="en-GB" smtClean="0"/>
-              <a:t>23/03/2015</a:t>
+              <a:t>27/03/2015</a:t>
             </a:fld>
             <a:endParaRPr lang="en-GB"/>
           </a:p>
@@ -638,7 +638,7 @@
           <a:p>
             <a:fld id="{D49555AC-EF36-440B-8C1B-720548F138AE}" type="datetimeFigureOut">
               <a:rPr lang="en-GB" smtClean="0"/>
-              <a:t>23/03/2015</a:t>
+              <a:t>27/03/2015</a:t>
             </a:fld>
             <a:endParaRPr lang="en-GB"/>
           </a:p>
@@ -808,7 +808,7 @@
           <a:p>
             <a:fld id="{D49555AC-EF36-440B-8C1B-720548F138AE}" type="datetimeFigureOut">
               <a:rPr lang="en-GB" smtClean="0"/>
-              <a:t>23/03/2015</a:t>
+              <a:t>27/03/2015</a:t>
             </a:fld>
             <a:endParaRPr lang="en-GB"/>
           </a:p>
@@ -1054,7 +1054,7 @@
           <a:p>
             <a:fld id="{D49555AC-EF36-440B-8C1B-720548F138AE}" type="datetimeFigureOut">
               <a:rPr lang="en-GB" smtClean="0"/>
-              <a:t>23/03/2015</a:t>
+              <a:t>27/03/2015</a:t>
             </a:fld>
             <a:endParaRPr lang="en-GB"/>
           </a:p>
@@ -1342,7 +1342,7 @@
           <a:p>
             <a:fld id="{D49555AC-EF36-440B-8C1B-720548F138AE}" type="datetimeFigureOut">
               <a:rPr lang="en-GB" smtClean="0"/>
-              <a:t>23/03/2015</a:t>
+              <a:t>27/03/2015</a:t>
             </a:fld>
             <a:endParaRPr lang="en-GB"/>
           </a:p>
@@ -1764,7 +1764,7 @@
           <a:p>
             <a:fld id="{D49555AC-EF36-440B-8C1B-720548F138AE}" type="datetimeFigureOut">
               <a:rPr lang="en-GB" smtClean="0"/>
-              <a:t>23/03/2015</a:t>
+              <a:t>27/03/2015</a:t>
             </a:fld>
             <a:endParaRPr lang="en-GB"/>
           </a:p>
@@ -1882,7 +1882,7 @@
           <a:p>
             <a:fld id="{D49555AC-EF36-440B-8C1B-720548F138AE}" type="datetimeFigureOut">
               <a:rPr lang="en-GB" smtClean="0"/>
-              <a:t>23/03/2015</a:t>
+              <a:t>27/03/2015</a:t>
             </a:fld>
             <a:endParaRPr lang="en-GB"/>
           </a:p>
@@ -1977,7 +1977,7 @@
           <a:p>
             <a:fld id="{D49555AC-EF36-440B-8C1B-720548F138AE}" type="datetimeFigureOut">
               <a:rPr lang="en-GB" smtClean="0"/>
-              <a:t>23/03/2015</a:t>
+              <a:t>27/03/2015</a:t>
             </a:fld>
             <a:endParaRPr lang="en-GB"/>
           </a:p>
@@ -2254,7 +2254,7 @@
           <a:p>
             <a:fld id="{D49555AC-EF36-440B-8C1B-720548F138AE}" type="datetimeFigureOut">
               <a:rPr lang="en-GB" smtClean="0"/>
-              <a:t>23/03/2015</a:t>
+              <a:t>27/03/2015</a:t>
             </a:fld>
             <a:endParaRPr lang="en-GB"/>
           </a:p>
@@ -2507,7 +2507,7 @@
           <a:p>
             <a:fld id="{D49555AC-EF36-440B-8C1B-720548F138AE}" type="datetimeFigureOut">
               <a:rPr lang="en-GB" smtClean="0"/>
-              <a:t>23/03/2015</a:t>
+              <a:t>27/03/2015</a:t>
             </a:fld>
             <a:endParaRPr lang="en-GB"/>
           </a:p>
@@ -2720,7 +2720,7 @@
           <a:p>
             <a:fld id="{D49555AC-EF36-440B-8C1B-720548F138AE}" type="datetimeFigureOut">
               <a:rPr lang="en-GB" smtClean="0"/>
-              <a:t>23/03/2015</a:t>
+              <a:t>27/03/2015</a:t>
             </a:fld>
             <a:endParaRPr lang="en-GB"/>
           </a:p>
@@ -3116,7 +3116,7 @@
         </p:blipFill>
         <p:spPr bwMode="auto">
           <a:xfrm>
-            <a:off x="6418081" y="1205629"/>
+            <a:off x="6302322" y="838538"/>
             <a:ext cx="2148403" cy="1660730"/>
           </a:xfrm>
           <a:prstGeom prst="rect">
@@ -6864,7 +6864,7 @@
         </p:nvGrpSpPr>
         <p:grpSpPr>
           <a:xfrm>
-            <a:off x="6364322" y="3522734"/>
+            <a:off x="6245226" y="2696385"/>
             <a:ext cx="2376264" cy="1645608"/>
             <a:chOff x="6588224" y="4879736"/>
             <a:chExt cx="2376264" cy="1645608"/>
@@ -7468,7 +7468,7 @@
         </p:blipFill>
         <p:spPr>
           <a:xfrm rot="16200000">
-            <a:off x="7052791" y="4886855"/>
+            <a:off x="6825590" y="3971774"/>
             <a:ext cx="1215536" cy="2138550"/>
           </a:xfrm>
           <a:prstGeom prst="rect">

</xml_diff>